<commit_message>
- Added installation guide for Bash on Ubuntu on Windows.
</commit_message>
<xml_diff>
--- a/docs/slides/master/BEACLS_Installation_Guide.pptx
+++ b/docs/slides/master/BEACLS_Installation_Guide.pptx
@@ -7,7 +7,7 @@
     <p:sldMasterId id="2147483737" r:id="rId3"/>
   </p:sldMasterIdLst>
   <p:notesMasterIdLst>
-    <p:notesMasterId r:id="rId28"/>
+    <p:notesMasterId r:id="rId32"/>
   </p:notesMasterIdLst>
   <p:sldIdLst>
     <p:sldId id="256" r:id="rId4"/>
@@ -33,7 +33,11 @@
     <p:sldId id="416" r:id="rId24"/>
     <p:sldId id="409" r:id="rId25"/>
     <p:sldId id="407" r:id="rId26"/>
-    <p:sldId id="397" r:id="rId27"/>
+    <p:sldId id="417" r:id="rId27"/>
+    <p:sldId id="419" r:id="rId28"/>
+    <p:sldId id="420" r:id="rId29"/>
+    <p:sldId id="418" r:id="rId30"/>
+    <p:sldId id="397" r:id="rId31"/>
   </p:sldIdLst>
   <p:sldSz cx="12192000" cy="6858000"/>
   <p:notesSz cx="6858000" cy="9144000"/>
@@ -222,7 +226,7 @@
           <a:p>
             <a:fld id="{7F36865F-2968-4FBD-B838-641F48D6CCC5}" type="datetimeFigureOut">
               <a:rPr kumimoji="1" lang="ja-JP" altLang="en-US" smtClean="0"/>
-              <a:t>2017/4/4</a:t>
+              <a:t>2017/4/11</a:t>
             </a:fld>
             <a:endParaRPr kumimoji="1" lang="ja-JP" altLang="en-US"/>
           </a:p>
@@ -747,7 +751,7 @@
           <a:p>
             <a:r>
               <a:rPr kumimoji="1" lang="en-US" altLang="ja-JP"/>
-              <a:t>2017/4/4</a:t>
+              <a:t>2017/4/11</a:t>
             </a:r>
             <a:endParaRPr kumimoji="1" lang="ja-JP" altLang="en-US"/>
           </a:p>
@@ -953,7 +957,7 @@
           <a:p>
             <a:r>
               <a:rPr kumimoji="1" lang="en-US" altLang="ja-JP"/>
-              <a:t>2017/4/4</a:t>
+              <a:t>2017/4/11</a:t>
             </a:r>
             <a:endParaRPr kumimoji="1" lang="ja-JP" altLang="en-US"/>
           </a:p>
@@ -1169,7 +1173,7 @@
           <a:p>
             <a:r>
               <a:rPr kumimoji="1" lang="en-US" altLang="ja-JP"/>
-              <a:t>2017/4/4</a:t>
+              <a:t>2017/4/11</a:t>
             </a:r>
             <a:endParaRPr kumimoji="1" lang="ja-JP" altLang="en-US"/>
           </a:p>
@@ -1376,7 +1380,7 @@
           <a:p>
             <a:r>
               <a:rPr kumimoji="1" lang="en-US" altLang="ja-JP"/>
-              <a:t>2017/4/4</a:t>
+              <a:t>2017/4/11</a:t>
             </a:r>
             <a:endParaRPr kumimoji="1" lang="ja-JP" altLang="en-US"/>
           </a:p>
@@ -1582,7 +1586,7 @@
           <a:p>
             <a:r>
               <a:rPr kumimoji="1" lang="en-US" altLang="ja-JP"/>
-              <a:t>2017/4/4</a:t>
+              <a:t>2017/4/11</a:t>
             </a:r>
             <a:endParaRPr kumimoji="1" lang="ja-JP" altLang="en-US"/>
           </a:p>
@@ -1837,7 +1841,7 @@
           <a:p>
             <a:r>
               <a:rPr kumimoji="1" lang="en-US" altLang="ja-JP"/>
-              <a:t>2017/4/4</a:t>
+              <a:t>2017/4/11</a:t>
             </a:r>
             <a:endParaRPr kumimoji="1" lang="ja-JP" altLang="en-US"/>
           </a:p>
@@ -2137,7 +2141,7 @@
           <a:p>
             <a:r>
               <a:rPr kumimoji="1" lang="en-US" altLang="ja-JP"/>
-              <a:t>2017/4/4</a:t>
+              <a:t>2017/4/11</a:t>
             </a:r>
             <a:endParaRPr kumimoji="1" lang="ja-JP" altLang="en-US"/>
           </a:p>
@@ -2552,7 +2556,7 @@
           <a:p>
             <a:r>
               <a:rPr kumimoji="1" lang="en-US" altLang="ja-JP"/>
-              <a:t>2017/4/4</a:t>
+              <a:t>2017/4/11</a:t>
             </a:r>
             <a:endParaRPr kumimoji="1" lang="ja-JP" altLang="en-US"/>
           </a:p>
@@ -2674,7 +2678,7 @@
           <a:p>
             <a:r>
               <a:rPr kumimoji="1" lang="en-US" altLang="ja-JP"/>
-              <a:t>2017/4/4</a:t>
+              <a:t>2017/4/11</a:t>
             </a:r>
             <a:endParaRPr kumimoji="1" lang="ja-JP" altLang="en-US"/>
           </a:p>
@@ -2796,7 +2800,7 @@
           <a:p>
             <a:r>
               <a:rPr kumimoji="1" lang="en-US" altLang="ja-JP"/>
-              <a:t>2017/4/4</a:t>
+              <a:t>2017/4/11</a:t>
             </a:r>
             <a:endParaRPr kumimoji="1" lang="ja-JP" altLang="en-US"/>
           </a:p>
@@ -3116,7 +3120,7 @@
           <a:p>
             <a:r>
               <a:rPr kumimoji="1" lang="en-US" altLang="ja-JP"/>
-              <a:t>2017/4/4</a:t>
+              <a:t>2017/4/11</a:t>
             </a:r>
             <a:endParaRPr kumimoji="1" lang="ja-JP" altLang="en-US"/>
           </a:p>
@@ -3322,7 +3326,7 @@
           <a:p>
             <a:r>
               <a:rPr kumimoji="1" lang="en-US" altLang="ja-JP"/>
-              <a:t>2017/4/4</a:t>
+              <a:t>2017/4/11</a:t>
             </a:r>
             <a:endParaRPr kumimoji="1" lang="ja-JP" altLang="en-US"/>
           </a:p>
@@ -3590,7 +3594,7 @@
           <a:p>
             <a:r>
               <a:rPr kumimoji="1" lang="en-US" altLang="ja-JP"/>
-              <a:t>2017/4/4</a:t>
+              <a:t>2017/4/11</a:t>
             </a:r>
             <a:endParaRPr kumimoji="1" lang="ja-JP" altLang="en-US"/>
           </a:p>
@@ -3796,7 +3800,7 @@
           <a:p>
             <a:r>
               <a:rPr kumimoji="1" lang="en-US" altLang="ja-JP"/>
-              <a:t>2017/4/4</a:t>
+              <a:t>2017/4/11</a:t>
             </a:r>
             <a:endParaRPr kumimoji="1" lang="ja-JP" altLang="en-US"/>
           </a:p>
@@ -4012,7 +4016,7 @@
           <a:p>
             <a:r>
               <a:rPr kumimoji="1" lang="en-US" altLang="ja-JP"/>
-              <a:t>2017/4/4</a:t>
+              <a:t>2017/4/11</a:t>
             </a:r>
             <a:endParaRPr kumimoji="1" lang="ja-JP" altLang="en-US"/>
           </a:p>
@@ -4219,7 +4223,7 @@
           <a:p>
             <a:r>
               <a:rPr kumimoji="1" lang="en-US" altLang="ja-JP"/>
-              <a:t>2017/4/4</a:t>
+              <a:t>2017/4/11</a:t>
             </a:r>
             <a:endParaRPr kumimoji="1" lang="ja-JP" altLang="en-US"/>
           </a:p>
@@ -4425,7 +4429,7 @@
           <a:p>
             <a:r>
               <a:rPr kumimoji="1" lang="en-US" altLang="ja-JP"/>
-              <a:t>2017/4/4</a:t>
+              <a:t>2017/4/11</a:t>
             </a:r>
             <a:endParaRPr kumimoji="1" lang="ja-JP" altLang="en-US"/>
           </a:p>
@@ -4680,7 +4684,7 @@
           <a:p>
             <a:r>
               <a:rPr kumimoji="1" lang="en-US" altLang="ja-JP"/>
-              <a:t>2017/4/4</a:t>
+              <a:t>2017/4/11</a:t>
             </a:r>
             <a:endParaRPr kumimoji="1" lang="ja-JP" altLang="en-US"/>
           </a:p>
@@ -4980,7 +4984,7 @@
           <a:p>
             <a:r>
               <a:rPr kumimoji="1" lang="en-US" altLang="ja-JP"/>
-              <a:t>2017/4/4</a:t>
+              <a:t>2017/4/11</a:t>
             </a:r>
             <a:endParaRPr kumimoji="1" lang="ja-JP" altLang="en-US"/>
           </a:p>
@@ -5395,7 +5399,7 @@
           <a:p>
             <a:r>
               <a:rPr kumimoji="1" lang="en-US" altLang="ja-JP"/>
-              <a:t>2017/4/4</a:t>
+              <a:t>2017/4/11</a:t>
             </a:r>
             <a:endParaRPr kumimoji="1" lang="ja-JP" altLang="en-US"/>
           </a:p>
@@ -5517,7 +5521,7 @@
           <a:p>
             <a:r>
               <a:rPr kumimoji="1" lang="en-US" altLang="ja-JP"/>
-              <a:t>2017/4/4</a:t>
+              <a:t>2017/4/11</a:t>
             </a:r>
             <a:endParaRPr kumimoji="1" lang="ja-JP" altLang="en-US"/>
           </a:p>
@@ -5639,7 +5643,7 @@
           <a:p>
             <a:r>
               <a:rPr kumimoji="1" lang="en-US" altLang="ja-JP"/>
-              <a:t>2017/4/4</a:t>
+              <a:t>2017/4/11</a:t>
             </a:r>
             <a:endParaRPr kumimoji="1" lang="ja-JP" altLang="en-US"/>
           </a:p>
@@ -5894,7 +5898,7 @@
           <a:p>
             <a:r>
               <a:rPr kumimoji="1" lang="en-US" altLang="ja-JP"/>
-              <a:t>2017/4/4</a:t>
+              <a:t>2017/4/11</a:t>
             </a:r>
             <a:endParaRPr kumimoji="1" lang="ja-JP" altLang="en-US"/>
           </a:p>
@@ -6214,7 +6218,7 @@
           <a:p>
             <a:r>
               <a:rPr kumimoji="1" lang="en-US" altLang="ja-JP"/>
-              <a:t>2017/4/4</a:t>
+              <a:t>2017/4/11</a:t>
             </a:r>
             <a:endParaRPr kumimoji="1" lang="ja-JP" altLang="en-US"/>
           </a:p>
@@ -6482,7 +6486,7 @@
           <a:p>
             <a:r>
               <a:rPr kumimoji="1" lang="en-US" altLang="ja-JP"/>
-              <a:t>2017/4/4</a:t>
+              <a:t>2017/4/11</a:t>
             </a:r>
             <a:endParaRPr kumimoji="1" lang="ja-JP" altLang="en-US"/>
           </a:p>
@@ -6688,7 +6692,7 @@
           <a:p>
             <a:r>
               <a:rPr kumimoji="1" lang="en-US" altLang="ja-JP"/>
-              <a:t>2017/4/4</a:t>
+              <a:t>2017/4/11</a:t>
             </a:r>
             <a:endParaRPr kumimoji="1" lang="ja-JP" altLang="en-US"/>
           </a:p>
@@ -6904,7 +6908,7 @@
           <a:p>
             <a:r>
               <a:rPr kumimoji="1" lang="en-US" altLang="ja-JP"/>
-              <a:t>2017/4/4</a:t>
+              <a:t>2017/4/11</a:t>
             </a:r>
             <a:endParaRPr kumimoji="1" lang="ja-JP" altLang="en-US"/>
           </a:p>
@@ -7204,7 +7208,7 @@
           <a:p>
             <a:r>
               <a:rPr kumimoji="1" lang="en-US" altLang="ja-JP"/>
-              <a:t>2017/4/4</a:t>
+              <a:t>2017/4/11</a:t>
             </a:r>
             <a:endParaRPr kumimoji="1" lang="ja-JP" altLang="en-US"/>
           </a:p>
@@ -7619,7 +7623,7 @@
           <a:p>
             <a:r>
               <a:rPr kumimoji="1" lang="en-US" altLang="ja-JP"/>
-              <a:t>2017/4/4</a:t>
+              <a:t>2017/4/11</a:t>
             </a:r>
             <a:endParaRPr kumimoji="1" lang="ja-JP" altLang="en-US"/>
           </a:p>
@@ -7741,7 +7745,7 @@
           <a:p>
             <a:r>
               <a:rPr kumimoji="1" lang="en-US" altLang="ja-JP"/>
-              <a:t>2017/4/4</a:t>
+              <a:t>2017/4/11</a:t>
             </a:r>
             <a:endParaRPr kumimoji="1" lang="ja-JP" altLang="en-US"/>
           </a:p>
@@ -7863,7 +7867,7 @@
           <a:p>
             <a:r>
               <a:rPr kumimoji="1" lang="en-US" altLang="ja-JP"/>
-              <a:t>2017/4/4</a:t>
+              <a:t>2017/4/11</a:t>
             </a:r>
             <a:endParaRPr kumimoji="1" lang="ja-JP" altLang="en-US"/>
           </a:p>
@@ -8183,7 +8187,7 @@
           <a:p>
             <a:r>
               <a:rPr kumimoji="1" lang="en-US" altLang="ja-JP"/>
-              <a:t>2017/4/4</a:t>
+              <a:t>2017/4/11</a:t>
             </a:r>
             <a:endParaRPr kumimoji="1" lang="ja-JP" altLang="en-US"/>
           </a:p>
@@ -8451,7 +8455,7 @@
           <a:p>
             <a:r>
               <a:rPr kumimoji="1" lang="en-US" altLang="ja-JP"/>
-              <a:t>2017/4/4</a:t>
+              <a:t>2017/4/11</a:t>
             </a:r>
             <a:endParaRPr kumimoji="1" lang="ja-JP" altLang="en-US"/>
           </a:p>
@@ -8701,7 +8705,7 @@
           <a:p>
             <a:r>
               <a:rPr kumimoji="1" lang="en-US" altLang="ja-JP"/>
-              <a:t>2017/4/4</a:t>
+              <a:t>2017/4/11</a:t>
             </a:r>
             <a:endParaRPr kumimoji="1" lang="ja-JP" altLang="en-US"/>
           </a:p>
@@ -9268,7 +9272,7 @@
           <a:p>
             <a:r>
               <a:rPr kumimoji="1" lang="en-US" altLang="ja-JP"/>
-              <a:t>2017/4/4</a:t>
+              <a:t>2017/4/11</a:t>
             </a:r>
             <a:endParaRPr kumimoji="1" lang="ja-JP" altLang="en-US"/>
           </a:p>
@@ -9835,7 +9839,7 @@
           <a:p>
             <a:r>
               <a:rPr kumimoji="1" lang="en-US" altLang="ja-JP"/>
-              <a:t>2017/4/4</a:t>
+              <a:t>2017/4/11</a:t>
             </a:r>
             <a:endParaRPr kumimoji="1" lang="ja-JP" altLang="en-US"/>
           </a:p>
@@ -10289,7 +10293,7 @@
           <a:p>
             <a:r>
               <a:rPr lang="en-US" altLang="ja-JP" dirty="0"/>
-              <a:t>2017/04/04</a:t>
+              <a:t>2017/04/11</a:t>
             </a:r>
             <a:endParaRPr kumimoji="1" lang="ja-JP" altLang="en-US" dirty="0"/>
           </a:p>
@@ -10312,7 +10316,7 @@
           <a:p>
             <a:r>
               <a:rPr kumimoji="1" lang="en-US" altLang="ja-JP"/>
-              <a:t>2017/4/4</a:t>
+              <a:t>2017/4/11</a:t>
             </a:r>
             <a:endParaRPr kumimoji="1" lang="ja-JP" altLang="en-US"/>
           </a:p>
@@ -10729,7 +10733,7 @@
           <a:p>
             <a:r>
               <a:rPr kumimoji="1" lang="en-US" altLang="ja-JP"/>
-              <a:t>2017/4/4</a:t>
+              <a:t>2017/4/11</a:t>
             </a:r>
             <a:endParaRPr kumimoji="1" lang="ja-JP" altLang="en-US"/>
           </a:p>
@@ -10915,6 +10919,18 @@
             </a:r>
           </a:p>
           <a:p>
+            <a:r>
+              <a:rPr lang="en-US" altLang="ja-JP" dirty="0">
+                <a:solidFill>
+                  <a:schemeClr val="bg1">
+                    <a:lumMod val="50000"/>
+                  </a:schemeClr>
+                </a:solidFill>
+              </a:rPr>
+              <a:t>Bash on Ubuntu on Windows without GPU</a:t>
+            </a:r>
+          </a:p>
+          <a:p>
             <a:pPr marL="0" indent="0">
               <a:buNone/>
             </a:pPr>
@@ -10939,7 +10955,7 @@
           <a:p>
             <a:r>
               <a:rPr kumimoji="1" lang="en-US" altLang="ja-JP"/>
-              <a:t>2017/4/4</a:t>
+              <a:t>2017/4/11</a:t>
             </a:r>
             <a:endParaRPr kumimoji="1" lang="ja-JP" altLang="en-US"/>
           </a:p>
@@ -11240,7 +11256,7 @@
           <a:p>
             <a:r>
               <a:rPr kumimoji="1" lang="en-US" altLang="ja-JP"/>
-              <a:t>2017/4/4</a:t>
+              <a:t>2017/4/11</a:t>
             </a:r>
             <a:endParaRPr kumimoji="1" lang="ja-JP" altLang="en-US"/>
           </a:p>
@@ -11517,7 +11533,7 @@
           <a:p>
             <a:r>
               <a:rPr kumimoji="1" lang="en-US" altLang="ja-JP"/>
-              <a:t>2017/4/4</a:t>
+              <a:t>2017/4/11</a:t>
             </a:r>
             <a:endParaRPr kumimoji="1" lang="ja-JP" altLang="en-US"/>
           </a:p>
@@ -11775,7 +11791,7 @@
           <a:p>
             <a:r>
               <a:rPr kumimoji="1" lang="en-US" altLang="ja-JP"/>
-              <a:t>2017/4/4</a:t>
+              <a:t>2017/4/11</a:t>
             </a:r>
             <a:endParaRPr kumimoji="1" lang="ja-JP" altLang="en-US"/>
           </a:p>
@@ -12088,7 +12104,7 @@
           <a:p>
             <a:r>
               <a:rPr kumimoji="1" lang="en-US" altLang="ja-JP"/>
-              <a:t>2017/4/4</a:t>
+              <a:t>2017/4/11</a:t>
             </a:r>
             <a:endParaRPr kumimoji="1" lang="ja-JP" altLang="en-US"/>
           </a:p>
@@ -12348,7 +12364,7 @@
           <a:p>
             <a:r>
               <a:rPr kumimoji="1" lang="en-US" altLang="ja-JP"/>
-              <a:t>2017/4/4</a:t>
+              <a:t>2017/4/11</a:t>
             </a:r>
             <a:endParaRPr kumimoji="1" lang="ja-JP" altLang="en-US"/>
           </a:p>
@@ -12605,7 +12621,7 @@
           <a:p>
             <a:r>
               <a:rPr kumimoji="1" lang="en-US" altLang="ja-JP"/>
-              <a:t>2017/4/4</a:t>
+              <a:t>2017/4/11</a:t>
             </a:r>
             <a:endParaRPr kumimoji="1" lang="ja-JP" altLang="en-US"/>
           </a:p>
@@ -12818,6 +12834,26 @@
               <a:rPr lang="en-US" altLang="ja-JP" dirty="0"/>
               <a:t>Windows with GPU</a:t>
             </a:r>
+            <a:endParaRPr lang="en-US" altLang="ja-JP" dirty="0">
+              <a:solidFill>
+                <a:schemeClr val="bg1">
+                  <a:lumMod val="50000"/>
+                </a:schemeClr>
+              </a:solidFill>
+            </a:endParaRPr>
+          </a:p>
+          <a:p>
+            <a:r>
+              <a:rPr lang="en-US" altLang="ja-JP" dirty="0">
+                <a:solidFill>
+                  <a:schemeClr val="bg1">
+                    <a:lumMod val="50000"/>
+                  </a:schemeClr>
+                </a:solidFill>
+              </a:rPr>
+              <a:t>Bash on Ubuntu on Windows without GPU</a:t>
+            </a:r>
+            <a:endParaRPr lang="en-US" altLang="ja-JP" dirty="0"/>
           </a:p>
           <a:p>
             <a:pPr marL="0" indent="0">
@@ -12844,7 +12880,7 @@
           <a:p>
             <a:r>
               <a:rPr kumimoji="1" lang="en-US" altLang="ja-JP"/>
-              <a:t>2017/4/4</a:t>
+              <a:t>2017/4/11</a:t>
             </a:r>
             <a:endParaRPr kumimoji="1" lang="ja-JP" altLang="en-US"/>
           </a:p>
@@ -13029,7 +13065,7 @@
           <a:p>
             <a:r>
               <a:rPr kumimoji="1" lang="en-US" altLang="ja-JP"/>
-              <a:t>2017/4/4</a:t>
+              <a:t>2017/4/11</a:t>
             </a:r>
             <a:endParaRPr kumimoji="1" lang="ja-JP" altLang="en-US"/>
           </a:p>
@@ -13185,6 +13221,15 @@
             </a:r>
           </a:p>
           <a:p>
+            <a:r>
+              <a:rPr lang="en-US" altLang="ja-JP" dirty="0"/>
+              <a:t>Bash on Ubuntu on Windows without GPU</a:t>
+            </a:r>
+          </a:p>
+          <a:p>
+            <a:endParaRPr lang="en-US" altLang="ja-JP" dirty="0"/>
+          </a:p>
+          <a:p>
             <a:pPr marL="0" indent="0">
               <a:buNone/>
             </a:pPr>
@@ -13209,7 +13254,7 @@
           <a:p>
             <a:r>
               <a:rPr kumimoji="1" lang="en-US" altLang="ja-JP"/>
-              <a:t>2017/4/4</a:t>
+              <a:t>2017/4/11</a:t>
             </a:r>
             <a:endParaRPr kumimoji="1" lang="ja-JP" altLang="en-US"/>
           </a:p>
@@ -13412,7 +13457,7 @@
           <a:p>
             <a:r>
               <a:rPr kumimoji="1" lang="en-US" altLang="ja-JP"/>
-              <a:t>2017/4/4</a:t>
+              <a:t>2017/4/11</a:t>
             </a:r>
             <a:endParaRPr kumimoji="1" lang="ja-JP" altLang="en-US"/>
           </a:p>
@@ -13534,7 +13579,7 @@
           <a:p>
             <a:r>
               <a:rPr kumimoji="1" lang="en-US" altLang="ja-JP"/>
-              <a:t>2017/4/4</a:t>
+              <a:t>2017/4/11</a:t>
             </a:r>
             <a:endParaRPr kumimoji="1" lang="ja-JP" altLang="en-US"/>
           </a:p>
@@ -13928,7 +13973,7 @@
           <a:p>
             <a:r>
               <a:rPr kumimoji="1" lang="en-US" altLang="ja-JP"/>
-              <a:t>2017/4/4</a:t>
+              <a:t>2017/4/11</a:t>
             </a:r>
             <a:endParaRPr kumimoji="1" lang="ja-JP" altLang="en-US"/>
           </a:p>
@@ -14176,7 +14221,7 @@
           <a:p>
             <a:r>
               <a:rPr kumimoji="1" lang="en-US" altLang="ja-JP"/>
-              <a:t>2017/4/4</a:t>
+              <a:t>2017/4/11</a:t>
             </a:r>
             <a:endParaRPr kumimoji="1" lang="ja-JP" altLang="en-US"/>
           </a:p>
@@ -14289,6 +14334,129 @@
       </p:grpSpPr>
       <p:sp>
         <p:nvSpPr>
+          <p:cNvPr id="2" name="タイトル 1"/>
+          <p:cNvSpPr>
+            <a:spLocks noGrp="1"/>
+          </p:cNvSpPr>
+          <p:nvPr>
+            <p:ph type="title"/>
+          </p:nvPr>
+        </p:nvSpPr>
+        <p:spPr/>
+        <p:txBody>
+          <a:bodyPr/>
+          <a:lstStyle/>
+          <a:p>
+            <a:r>
+              <a:rPr kumimoji="1" lang="en-US" altLang="ja-JP" dirty="0"/>
+              <a:t>Table of contents</a:t>
+            </a:r>
+            <a:endParaRPr kumimoji="1" lang="ja-JP" altLang="en-US" dirty="0"/>
+          </a:p>
+        </p:txBody>
+      </p:sp>
+      <p:sp>
+        <p:nvSpPr>
+          <p:cNvPr id="3" name="コンテンツ プレースホルダー 2"/>
+          <p:cNvSpPr>
+            <a:spLocks noGrp="1"/>
+          </p:cNvSpPr>
+          <p:nvPr>
+            <p:ph idx="1"/>
+          </p:nvPr>
+        </p:nvSpPr>
+        <p:spPr/>
+        <p:txBody>
+          <a:bodyPr/>
+          <a:lstStyle/>
+          <a:p>
+            <a:r>
+              <a:rPr kumimoji="1" lang="en-US" altLang="ja-JP" dirty="0">
+                <a:solidFill>
+                  <a:schemeClr val="bg1">
+                    <a:lumMod val="50000"/>
+                  </a:schemeClr>
+                </a:solidFill>
+              </a:rPr>
+              <a:t>System requirement</a:t>
+            </a:r>
+          </a:p>
+          <a:p>
+            <a:r>
+              <a:rPr lang="en-US" altLang="ja-JP" dirty="0">
+                <a:solidFill>
+                  <a:schemeClr val="bg1">
+                    <a:lumMod val="50000"/>
+                  </a:schemeClr>
+                </a:solidFill>
+              </a:rPr>
+              <a:t>Mac OS X</a:t>
+            </a:r>
+          </a:p>
+          <a:p>
+            <a:r>
+              <a:rPr lang="en-US" altLang="ja-JP" dirty="0">
+                <a:solidFill>
+                  <a:schemeClr val="bg1">
+                    <a:lumMod val="50000"/>
+                  </a:schemeClr>
+                </a:solidFill>
+              </a:rPr>
+              <a:t>Ubuntu Linux without GPU</a:t>
+            </a:r>
+          </a:p>
+          <a:p>
+            <a:r>
+              <a:rPr lang="en-US" altLang="ja-JP" dirty="0">
+                <a:solidFill>
+                  <a:schemeClr val="bg1">
+                    <a:lumMod val="50000"/>
+                  </a:schemeClr>
+                </a:solidFill>
+              </a:rPr>
+              <a:t>Ubuntu Linux with GPU</a:t>
+            </a:r>
+          </a:p>
+          <a:p>
+            <a:r>
+              <a:rPr lang="en-US" altLang="ja-JP" dirty="0">
+                <a:solidFill>
+                  <a:schemeClr val="bg1">
+                    <a:lumMod val="50000"/>
+                  </a:schemeClr>
+                </a:solidFill>
+              </a:rPr>
+              <a:t>Windows without GPU</a:t>
+            </a:r>
+          </a:p>
+          <a:p>
+            <a:r>
+              <a:rPr lang="en-US" altLang="ja-JP" dirty="0">
+                <a:solidFill>
+                  <a:schemeClr val="bg1">
+                    <a:lumMod val="50000"/>
+                  </a:schemeClr>
+                </a:solidFill>
+              </a:rPr>
+              <a:t>Windows with GPU</a:t>
+            </a:r>
+          </a:p>
+          <a:p>
+            <a:r>
+              <a:rPr lang="en-US" altLang="ja-JP" dirty="0"/>
+              <a:t>Bash on Ubuntu on Windows without GPU</a:t>
+            </a:r>
+          </a:p>
+          <a:p>
+            <a:pPr marL="0" indent="0">
+              <a:buNone/>
+            </a:pPr>
+            <a:endParaRPr kumimoji="1" lang="ja-JP" altLang="en-US" dirty="0"/>
+          </a:p>
+        </p:txBody>
+      </p:sp>
+      <p:sp>
+        <p:nvSpPr>
           <p:cNvPr id="4" name="日付プレースホルダー 3"/>
           <p:cNvSpPr>
             <a:spLocks noGrp="1"/>
@@ -14304,7 +14472,7 @@
           <a:p>
             <a:r>
               <a:rPr kumimoji="1" lang="en-US" altLang="ja-JP"/>
-              <a:t>2017/4/4</a:t>
+              <a:t>2017/4/11</a:t>
             </a:r>
             <a:endParaRPr kumimoji="1" lang="ja-JP" altLang="en-US"/>
           </a:p>
@@ -14351,6 +14519,783 @@
             <a:fld id="{E1773B30-14F7-487C-92FB-E55AB7D5608F}" type="slidenum">
               <a:rPr kumimoji="1" lang="ja-JP" altLang="en-US" smtClean="0"/>
               <a:t>24</a:t>
+            </a:fld>
+            <a:endParaRPr kumimoji="1" lang="ja-JP" altLang="en-US"/>
+          </a:p>
+        </p:txBody>
+      </p:sp>
+    </p:spTree>
+    <p:extLst>
+      <p:ext uri="{BB962C8B-B14F-4D97-AF65-F5344CB8AC3E}">
+        <p14:creationId xmlns:p14="http://schemas.microsoft.com/office/powerpoint/2010/main" val="2959419769"/>
+      </p:ext>
+    </p:extLst>
+  </p:cSld>
+  <p:clrMapOvr>
+    <a:masterClrMapping/>
+  </p:clrMapOvr>
+</p:sld>
+</file>
+
+<file path=ppt/slides/slide25.xml><?xml version="1.0" encoding="utf-8"?>
+<p:sld xmlns:a="http://schemas.openxmlformats.org/drawingml/2006/main" xmlns:r="http://schemas.openxmlformats.org/officeDocument/2006/relationships" xmlns:p="http://schemas.openxmlformats.org/presentationml/2006/main">
+  <p:cSld>
+    <p:spTree>
+      <p:nvGrpSpPr>
+        <p:cNvPr id="1" name=""/>
+        <p:cNvGrpSpPr/>
+        <p:nvPr/>
+      </p:nvGrpSpPr>
+      <p:grpSpPr>
+        <a:xfrm>
+          <a:off x="0" y="0"/>
+          <a:ext cx="0" cy="0"/>
+          <a:chOff x="0" y="0"/>
+          <a:chExt cx="0" cy="0"/>
+        </a:xfrm>
+      </p:grpSpPr>
+      <p:sp>
+        <p:nvSpPr>
+          <p:cNvPr id="2" name="タイトル 1"/>
+          <p:cNvSpPr>
+            <a:spLocks noGrp="1"/>
+          </p:cNvSpPr>
+          <p:nvPr>
+            <p:ph type="title"/>
+          </p:nvPr>
+        </p:nvSpPr>
+        <p:spPr/>
+        <p:txBody>
+          <a:bodyPr>
+            <a:normAutofit/>
+          </a:bodyPr>
+          <a:lstStyle/>
+          <a:p>
+            <a:r>
+              <a:rPr lang="en-US" altLang="ja-JP" sz="3600" dirty="0"/>
+              <a:t>Install to Bash on Ubuntu on Windows (Without GPU)</a:t>
+            </a:r>
+            <a:endParaRPr kumimoji="1" lang="ja-JP" altLang="en-US" sz="3600" dirty="0"/>
+          </a:p>
+        </p:txBody>
+      </p:sp>
+      <p:sp>
+        <p:nvSpPr>
+          <p:cNvPr id="3" name="コンテンツ プレースホルダー 2"/>
+          <p:cNvSpPr>
+            <a:spLocks noGrp="1"/>
+          </p:cNvSpPr>
+          <p:nvPr>
+            <p:ph idx="1"/>
+          </p:nvPr>
+        </p:nvSpPr>
+        <p:spPr/>
+        <p:txBody>
+          <a:bodyPr>
+            <a:normAutofit/>
+          </a:bodyPr>
+          <a:lstStyle/>
+          <a:p>
+            <a:pPr marL="514350" indent="-514350">
+              <a:buFont typeface="+mj-lt"/>
+              <a:buAutoNum type="arabicPeriod"/>
+            </a:pPr>
+            <a:r>
+              <a:rPr lang="en-US" altLang="ja-JP" dirty="0"/>
+              <a:t>Update Windows 10 to Windows 10 Creators Update (version 1703, Redstone 2)</a:t>
+            </a:r>
+          </a:p>
+          <a:p>
+            <a:pPr marL="514350" indent="-514350">
+              <a:buFont typeface="+mj-lt"/>
+              <a:buAutoNum type="arabicPeriod"/>
+            </a:pPr>
+            <a:r>
+              <a:rPr lang="en-US" altLang="ja-JP" dirty="0"/>
+              <a:t>Install Bash on Ubuntu on Windows</a:t>
+            </a:r>
+          </a:p>
+          <a:p>
+            <a:pPr marL="457200" lvl="1" indent="0">
+              <a:buNone/>
+            </a:pPr>
+            <a:r>
+              <a:rPr lang="en-US" altLang="ja-JP" dirty="0"/>
+              <a:t>https://msdn.microsoft.com/en-us/commandline/wsl/install_guide</a:t>
+            </a:r>
+          </a:p>
+          <a:p>
+            <a:pPr marL="514350" indent="-514350">
+              <a:buFont typeface="+mj-lt"/>
+              <a:buAutoNum type="arabicPeriod"/>
+            </a:pPr>
+            <a:r>
+              <a:rPr lang="en-US" altLang="ja-JP" dirty="0"/>
+              <a:t>Run bash</a:t>
+            </a:r>
+          </a:p>
+        </p:txBody>
+      </p:sp>
+      <p:sp>
+        <p:nvSpPr>
+          <p:cNvPr id="4" name="日付プレースホルダー 3"/>
+          <p:cNvSpPr>
+            <a:spLocks noGrp="1"/>
+          </p:cNvSpPr>
+          <p:nvPr>
+            <p:ph type="dt" sz="half" idx="10"/>
+          </p:nvPr>
+        </p:nvSpPr>
+        <p:spPr/>
+        <p:txBody>
+          <a:bodyPr/>
+          <a:lstStyle/>
+          <a:p>
+            <a:r>
+              <a:rPr kumimoji="1" lang="en-US" altLang="ja-JP"/>
+              <a:t>2017/4/11</a:t>
+            </a:r>
+            <a:endParaRPr kumimoji="1" lang="ja-JP" altLang="en-US"/>
+          </a:p>
+        </p:txBody>
+      </p:sp>
+      <p:sp>
+        <p:nvSpPr>
+          <p:cNvPr id="5" name="フッター プレースホルダー 4"/>
+          <p:cNvSpPr>
+            <a:spLocks noGrp="1"/>
+          </p:cNvSpPr>
+          <p:nvPr>
+            <p:ph type="ftr" sz="quarter" idx="11"/>
+          </p:nvPr>
+        </p:nvSpPr>
+        <p:spPr/>
+        <p:txBody>
+          <a:bodyPr/>
+          <a:lstStyle/>
+          <a:p>
+            <a:r>
+              <a:rPr kumimoji="1" lang="en-US" altLang="ja-JP"/>
+              <a:t>BEACLS: Berkeley Efficient API in C++ for Level Set methods Installation Guide</a:t>
+            </a:r>
+            <a:endParaRPr kumimoji="1" lang="ja-JP" altLang="en-US"/>
+          </a:p>
+        </p:txBody>
+      </p:sp>
+      <p:sp>
+        <p:nvSpPr>
+          <p:cNvPr id="6" name="スライド番号プレースホルダー 5"/>
+          <p:cNvSpPr>
+            <a:spLocks noGrp="1"/>
+          </p:cNvSpPr>
+          <p:nvPr>
+            <p:ph type="sldNum" sz="quarter" idx="12"/>
+          </p:nvPr>
+        </p:nvSpPr>
+        <p:spPr/>
+        <p:txBody>
+          <a:bodyPr/>
+          <a:lstStyle/>
+          <a:p>
+            <a:fld id="{E1773B30-14F7-487C-92FB-E55AB7D5608F}" type="slidenum">
+              <a:rPr kumimoji="1" lang="ja-JP" altLang="en-US" smtClean="0"/>
+              <a:t>25</a:t>
+            </a:fld>
+            <a:endParaRPr kumimoji="1" lang="ja-JP" altLang="en-US"/>
+          </a:p>
+        </p:txBody>
+      </p:sp>
+    </p:spTree>
+    <p:extLst>
+      <p:ext uri="{BB962C8B-B14F-4D97-AF65-F5344CB8AC3E}">
+        <p14:creationId xmlns:p14="http://schemas.microsoft.com/office/powerpoint/2010/main" val="1325898173"/>
+      </p:ext>
+    </p:extLst>
+  </p:cSld>
+  <p:clrMapOvr>
+    <a:masterClrMapping/>
+  </p:clrMapOvr>
+</p:sld>
+</file>
+
+<file path=ppt/slides/slide26.xml><?xml version="1.0" encoding="utf-8"?>
+<p:sld xmlns:a="http://schemas.openxmlformats.org/drawingml/2006/main" xmlns:r="http://schemas.openxmlformats.org/officeDocument/2006/relationships" xmlns:p="http://schemas.openxmlformats.org/presentationml/2006/main">
+  <p:cSld>
+    <p:spTree>
+      <p:nvGrpSpPr>
+        <p:cNvPr id="1" name=""/>
+        <p:cNvGrpSpPr/>
+        <p:nvPr/>
+      </p:nvGrpSpPr>
+      <p:grpSpPr>
+        <a:xfrm>
+          <a:off x="0" y="0"/>
+          <a:ext cx="0" cy="0"/>
+          <a:chOff x="0" y="0"/>
+          <a:chExt cx="0" cy="0"/>
+        </a:xfrm>
+      </p:grpSpPr>
+      <p:sp>
+        <p:nvSpPr>
+          <p:cNvPr id="2" name="タイトル 1"/>
+          <p:cNvSpPr>
+            <a:spLocks noGrp="1"/>
+          </p:cNvSpPr>
+          <p:nvPr>
+            <p:ph type="title"/>
+          </p:nvPr>
+        </p:nvSpPr>
+        <p:spPr/>
+        <p:txBody>
+          <a:bodyPr>
+            <a:normAutofit/>
+          </a:bodyPr>
+          <a:lstStyle/>
+          <a:p>
+            <a:r>
+              <a:rPr lang="en-US" altLang="ja-JP" sz="3600" dirty="0"/>
+              <a:t>Install to Bash on Ubuntu on Windows (Without GPU)</a:t>
+            </a:r>
+            <a:br>
+              <a:rPr lang="en-US" altLang="ja-JP" sz="3600" dirty="0"/>
+            </a:br>
+            <a:r>
+              <a:rPr lang="en-US" altLang="ja-JP" sz="3600" dirty="0"/>
+              <a:t>(cont’d)</a:t>
+            </a:r>
+            <a:endParaRPr kumimoji="1" lang="ja-JP" altLang="en-US" sz="3600" dirty="0"/>
+          </a:p>
+        </p:txBody>
+      </p:sp>
+      <p:sp>
+        <p:nvSpPr>
+          <p:cNvPr id="3" name="コンテンツ プレースホルダー 2"/>
+          <p:cNvSpPr>
+            <a:spLocks noGrp="1"/>
+          </p:cNvSpPr>
+          <p:nvPr>
+            <p:ph idx="1"/>
+          </p:nvPr>
+        </p:nvSpPr>
+        <p:spPr/>
+        <p:txBody>
+          <a:bodyPr>
+            <a:normAutofit fontScale="85000" lnSpcReduction="20000"/>
+          </a:bodyPr>
+          <a:lstStyle/>
+          <a:p>
+            <a:pPr marL="514350" indent="-514350">
+              <a:buFont typeface="+mj-lt"/>
+              <a:buAutoNum type="arabicPeriod" startAt="4"/>
+            </a:pPr>
+            <a:r>
+              <a:rPr lang="en-US" altLang="ja-JP" dirty="0"/>
+              <a:t>Install boost, OpenCV and hdf5</a:t>
+            </a:r>
+          </a:p>
+          <a:p>
+            <a:pPr marL="457200" lvl="1" indent="0">
+              <a:buNone/>
+            </a:pPr>
+            <a:r>
+              <a:rPr lang="en-US" altLang="ja-JP" dirty="0"/>
+              <a:t>$ </a:t>
+            </a:r>
+            <a:r>
+              <a:rPr lang="en-US" altLang="ja-JP" dirty="0" err="1"/>
+              <a:t>sudo</a:t>
+            </a:r>
+            <a:r>
+              <a:rPr lang="en-US" altLang="ja-JP" dirty="0"/>
+              <a:t> apt-get update</a:t>
+            </a:r>
+          </a:p>
+          <a:p>
+            <a:pPr marL="457200" lvl="1" indent="0">
+              <a:buNone/>
+            </a:pPr>
+            <a:r>
+              <a:rPr lang="en-US" altLang="ja-JP" dirty="0"/>
+              <a:t>$ </a:t>
+            </a:r>
+            <a:r>
+              <a:rPr lang="en-US" altLang="ja-JP" dirty="0" err="1"/>
+              <a:t>sudo</a:t>
+            </a:r>
+            <a:r>
+              <a:rPr lang="en-US" altLang="ja-JP" dirty="0"/>
+              <a:t> apt-get upgrade</a:t>
+            </a:r>
+          </a:p>
+          <a:p>
+            <a:pPr marL="457200" lvl="1" indent="0">
+              <a:buNone/>
+            </a:pPr>
+            <a:r>
+              <a:rPr lang="en-US" altLang="ja-JP" dirty="0"/>
+              <a:t>$ </a:t>
+            </a:r>
+            <a:r>
+              <a:rPr lang="en-US" altLang="ja-JP" dirty="0" err="1"/>
+              <a:t>sudo</a:t>
+            </a:r>
+            <a:r>
+              <a:rPr lang="en-US" altLang="ja-JP" dirty="0"/>
+              <a:t> apt-get install libhdf5-dev </a:t>
+            </a:r>
+            <a:r>
+              <a:rPr lang="en-US" altLang="ja-JP" dirty="0" err="1"/>
+              <a:t>libboost</a:t>
+            </a:r>
+            <a:r>
+              <a:rPr lang="en-US" altLang="ja-JP" dirty="0"/>
+              <a:t>-dev </a:t>
+            </a:r>
+            <a:r>
+              <a:rPr lang="en-US" altLang="ja-JP" dirty="0" err="1"/>
+              <a:t>libopencv</a:t>
+            </a:r>
+            <a:r>
+              <a:rPr lang="en-US" altLang="ja-JP" dirty="0"/>
+              <a:t>-dev</a:t>
+            </a:r>
+          </a:p>
+          <a:p>
+            <a:pPr marL="514350" indent="-514350">
+              <a:buFont typeface="+mj-lt"/>
+              <a:buAutoNum type="arabicPeriod" startAt="4"/>
+            </a:pPr>
+            <a:r>
+              <a:rPr lang="en-US" altLang="ja-JP" dirty="0"/>
+              <a:t>Download BEACLS</a:t>
+            </a:r>
+          </a:p>
+          <a:p>
+            <a:pPr marL="457200" lvl="1" indent="0">
+              <a:buNone/>
+            </a:pPr>
+            <a:r>
+              <a:rPr lang="en-US" altLang="ja-JP" dirty="0"/>
+              <a:t>$ </a:t>
+            </a:r>
+            <a:r>
+              <a:rPr lang="en-US" altLang="ja-JP" dirty="0" err="1"/>
+              <a:t>mkdir</a:t>
+            </a:r>
+            <a:r>
+              <a:rPr lang="en-US" altLang="ja-JP" dirty="0"/>
+              <a:t> ~/BEACLS; cd ~/BEACLS</a:t>
+            </a:r>
+          </a:p>
+          <a:p>
+            <a:pPr marL="457200" lvl="1" indent="0">
+              <a:buNone/>
+            </a:pPr>
+            <a:r>
+              <a:rPr lang="en-US" altLang="ja-JP" dirty="0"/>
+              <a:t>$ </a:t>
+            </a:r>
+            <a:r>
+              <a:rPr lang="en-US" altLang="ja-JP" dirty="0" err="1"/>
+              <a:t>git</a:t>
+            </a:r>
+            <a:r>
+              <a:rPr lang="en-US" altLang="ja-JP" dirty="0"/>
+              <a:t> clone </a:t>
+            </a:r>
+            <a:r>
+              <a:rPr lang="en-US" altLang="ja-JP" dirty="0">
+                <a:hlinkClick r:id="rId2"/>
+              </a:rPr>
+              <a:t>https://github.com/HJReachability/beacls</a:t>
+            </a:r>
+            <a:endParaRPr lang="en-US" altLang="ja-JP" dirty="0"/>
+          </a:p>
+          <a:p>
+            <a:pPr marL="457200" lvl="1" indent="0">
+              <a:buNone/>
+            </a:pPr>
+            <a:r>
+              <a:rPr lang="en-US" altLang="ja-JP" dirty="0"/>
+              <a:t>$ cd </a:t>
+            </a:r>
+            <a:r>
+              <a:rPr lang="en-US" altLang="ja-JP" dirty="0" err="1"/>
+              <a:t>beacls</a:t>
+            </a:r>
+            <a:endParaRPr lang="en-US" altLang="ja-JP" dirty="0"/>
+          </a:p>
+          <a:p>
+            <a:pPr marL="514350" indent="-514350">
+              <a:buFont typeface="+mj-lt"/>
+              <a:buAutoNum type="arabicPeriod" startAt="4"/>
+            </a:pPr>
+            <a:r>
+              <a:rPr lang="en-US" altLang="ja-JP" dirty="0"/>
+              <a:t>Build BEACLS</a:t>
+            </a:r>
+          </a:p>
+          <a:p>
+            <a:pPr marL="457200" lvl="1" indent="0">
+              <a:buNone/>
+            </a:pPr>
+            <a:r>
+              <a:rPr lang="en-US" altLang="ja-JP" dirty="0"/>
+              <a:t>$ cd </a:t>
+            </a:r>
+            <a:r>
+              <a:rPr lang="en-US" altLang="ja-JP" dirty="0" err="1"/>
+              <a:t>beacls</a:t>
+            </a:r>
+            <a:r>
+              <a:rPr lang="en-US" altLang="ja-JP" dirty="0"/>
+              <a:t>/sources</a:t>
+            </a:r>
+          </a:p>
+          <a:p>
+            <a:pPr marL="457200" lvl="1" indent="0">
+              <a:buNone/>
+            </a:pPr>
+            <a:r>
+              <a:rPr lang="en-US" altLang="ja-JP" dirty="0"/>
+              <a:t>$ make all</a:t>
+            </a:r>
+          </a:p>
+          <a:p>
+            <a:pPr marL="514350" indent="-514350">
+              <a:buFont typeface="+mj-lt"/>
+              <a:buAutoNum type="arabicPeriod" startAt="4"/>
+            </a:pPr>
+            <a:r>
+              <a:rPr lang="en-US" altLang="ja-JP" dirty="0"/>
+              <a:t>Test BEACLS</a:t>
+            </a:r>
+          </a:p>
+          <a:p>
+            <a:pPr marL="457200" lvl="1" indent="0">
+              <a:buNone/>
+            </a:pPr>
+            <a:r>
+              <a:rPr lang="en-US" altLang="ja-JP" dirty="0"/>
+              <a:t>$ cd samples/</a:t>
+            </a:r>
+            <a:r>
+              <a:rPr lang="en-US" altLang="ja-JP" dirty="0" err="1"/>
+              <a:t>Plane_test</a:t>
+            </a:r>
+            <a:endParaRPr lang="en-US" altLang="ja-JP" dirty="0"/>
+          </a:p>
+          <a:p>
+            <a:pPr marL="457200" lvl="1" indent="0">
+              <a:buNone/>
+            </a:pPr>
+            <a:r>
+              <a:rPr lang="en-US" altLang="ja-JP" dirty="0"/>
+              <a:t>$ make test</a:t>
+            </a:r>
+          </a:p>
+        </p:txBody>
+      </p:sp>
+      <p:sp>
+        <p:nvSpPr>
+          <p:cNvPr id="4" name="日付プレースホルダー 3"/>
+          <p:cNvSpPr>
+            <a:spLocks noGrp="1"/>
+          </p:cNvSpPr>
+          <p:nvPr>
+            <p:ph type="dt" sz="half" idx="10"/>
+          </p:nvPr>
+        </p:nvSpPr>
+        <p:spPr/>
+        <p:txBody>
+          <a:bodyPr/>
+          <a:lstStyle/>
+          <a:p>
+            <a:r>
+              <a:rPr kumimoji="1" lang="en-US" altLang="ja-JP"/>
+              <a:t>2017/4/11</a:t>
+            </a:r>
+            <a:endParaRPr kumimoji="1" lang="ja-JP" altLang="en-US"/>
+          </a:p>
+        </p:txBody>
+      </p:sp>
+      <p:sp>
+        <p:nvSpPr>
+          <p:cNvPr id="5" name="フッター プレースホルダー 4"/>
+          <p:cNvSpPr>
+            <a:spLocks noGrp="1"/>
+          </p:cNvSpPr>
+          <p:nvPr>
+            <p:ph type="ftr" sz="quarter" idx="11"/>
+          </p:nvPr>
+        </p:nvSpPr>
+        <p:spPr/>
+        <p:txBody>
+          <a:bodyPr/>
+          <a:lstStyle/>
+          <a:p>
+            <a:r>
+              <a:rPr kumimoji="1" lang="en-US" altLang="ja-JP"/>
+              <a:t>BEACLS: Berkeley Efficient API in C++ for Level Set methods Installation Guide</a:t>
+            </a:r>
+            <a:endParaRPr kumimoji="1" lang="ja-JP" altLang="en-US"/>
+          </a:p>
+        </p:txBody>
+      </p:sp>
+      <p:sp>
+        <p:nvSpPr>
+          <p:cNvPr id="6" name="スライド番号プレースホルダー 5"/>
+          <p:cNvSpPr>
+            <a:spLocks noGrp="1"/>
+          </p:cNvSpPr>
+          <p:nvPr>
+            <p:ph type="sldNum" sz="quarter" idx="12"/>
+          </p:nvPr>
+        </p:nvSpPr>
+        <p:spPr/>
+        <p:txBody>
+          <a:bodyPr/>
+          <a:lstStyle/>
+          <a:p>
+            <a:fld id="{E1773B30-14F7-487C-92FB-E55AB7D5608F}" type="slidenum">
+              <a:rPr kumimoji="1" lang="ja-JP" altLang="en-US" smtClean="0"/>
+              <a:t>26</a:t>
+            </a:fld>
+            <a:endParaRPr kumimoji="1" lang="ja-JP" altLang="en-US"/>
+          </a:p>
+        </p:txBody>
+      </p:sp>
+    </p:spTree>
+    <p:extLst>
+      <p:ext uri="{BB962C8B-B14F-4D97-AF65-F5344CB8AC3E}">
+        <p14:creationId xmlns:p14="http://schemas.microsoft.com/office/powerpoint/2010/main" val="3505045182"/>
+      </p:ext>
+    </p:extLst>
+  </p:cSld>
+  <p:clrMapOvr>
+    <a:masterClrMapping/>
+  </p:clrMapOvr>
+</p:sld>
+</file>
+
+<file path=ppt/slides/slide27.xml><?xml version="1.0" encoding="utf-8"?>
+<p:sld xmlns:a="http://schemas.openxmlformats.org/drawingml/2006/main" xmlns:r="http://schemas.openxmlformats.org/officeDocument/2006/relationships" xmlns:p="http://schemas.openxmlformats.org/presentationml/2006/main">
+  <p:cSld>
+    <p:spTree>
+      <p:nvGrpSpPr>
+        <p:cNvPr id="1" name=""/>
+        <p:cNvGrpSpPr/>
+        <p:nvPr/>
+      </p:nvGrpSpPr>
+      <p:grpSpPr>
+        <a:xfrm>
+          <a:off x="0" y="0"/>
+          <a:ext cx="0" cy="0"/>
+          <a:chOff x="0" y="0"/>
+          <a:chExt cx="0" cy="0"/>
+        </a:xfrm>
+      </p:grpSpPr>
+      <p:sp>
+        <p:nvSpPr>
+          <p:cNvPr id="2" name="タイトル 1"/>
+          <p:cNvSpPr>
+            <a:spLocks noGrp="1"/>
+          </p:cNvSpPr>
+          <p:nvPr>
+            <p:ph type="title"/>
+          </p:nvPr>
+        </p:nvSpPr>
+        <p:spPr/>
+        <p:txBody>
+          <a:bodyPr/>
+          <a:lstStyle/>
+          <a:p>
+            <a:endParaRPr kumimoji="1" lang="ja-JP" altLang="en-US"/>
+          </a:p>
+        </p:txBody>
+      </p:sp>
+      <p:sp>
+        <p:nvSpPr>
+          <p:cNvPr id="3" name="コンテンツ プレースホルダー 2"/>
+          <p:cNvSpPr>
+            <a:spLocks noGrp="1"/>
+          </p:cNvSpPr>
+          <p:nvPr>
+            <p:ph idx="1"/>
+          </p:nvPr>
+        </p:nvSpPr>
+        <p:spPr/>
+        <p:txBody>
+          <a:bodyPr/>
+          <a:lstStyle/>
+          <a:p>
+            <a:endParaRPr kumimoji="1" lang="ja-JP" altLang="en-US"/>
+          </a:p>
+        </p:txBody>
+      </p:sp>
+      <p:sp>
+        <p:nvSpPr>
+          <p:cNvPr id="4" name="日付プレースホルダー 3"/>
+          <p:cNvSpPr>
+            <a:spLocks noGrp="1"/>
+          </p:cNvSpPr>
+          <p:nvPr>
+            <p:ph type="dt" sz="half" idx="10"/>
+          </p:nvPr>
+        </p:nvSpPr>
+        <p:spPr/>
+        <p:txBody>
+          <a:bodyPr/>
+          <a:lstStyle/>
+          <a:p>
+            <a:r>
+              <a:rPr kumimoji="1" lang="en-US" altLang="ja-JP"/>
+              <a:t>2017/4/11</a:t>
+            </a:r>
+            <a:endParaRPr kumimoji="1" lang="ja-JP" altLang="en-US"/>
+          </a:p>
+        </p:txBody>
+      </p:sp>
+      <p:sp>
+        <p:nvSpPr>
+          <p:cNvPr id="5" name="フッター プレースホルダー 4"/>
+          <p:cNvSpPr>
+            <a:spLocks noGrp="1"/>
+          </p:cNvSpPr>
+          <p:nvPr>
+            <p:ph type="ftr" sz="quarter" idx="11"/>
+          </p:nvPr>
+        </p:nvSpPr>
+        <p:spPr/>
+        <p:txBody>
+          <a:bodyPr/>
+          <a:lstStyle/>
+          <a:p>
+            <a:r>
+              <a:rPr kumimoji="1" lang="en-US" altLang="ja-JP"/>
+              <a:t>BEACLS: Berkeley Efficient API in C++ for Level Set methods Installation Guide</a:t>
+            </a:r>
+            <a:endParaRPr kumimoji="1" lang="ja-JP" altLang="en-US"/>
+          </a:p>
+        </p:txBody>
+      </p:sp>
+      <p:sp>
+        <p:nvSpPr>
+          <p:cNvPr id="6" name="スライド番号プレースホルダー 5"/>
+          <p:cNvSpPr>
+            <a:spLocks noGrp="1"/>
+          </p:cNvSpPr>
+          <p:nvPr>
+            <p:ph type="sldNum" sz="quarter" idx="12"/>
+          </p:nvPr>
+        </p:nvSpPr>
+        <p:spPr/>
+        <p:txBody>
+          <a:bodyPr/>
+          <a:lstStyle/>
+          <a:p>
+            <a:fld id="{E1773B30-14F7-487C-92FB-E55AB7D5608F}" type="slidenum">
+              <a:rPr kumimoji="1" lang="ja-JP" altLang="en-US" smtClean="0"/>
+              <a:t>27</a:t>
+            </a:fld>
+            <a:endParaRPr kumimoji="1" lang="ja-JP" altLang="en-US"/>
+          </a:p>
+        </p:txBody>
+      </p:sp>
+    </p:spTree>
+    <p:extLst>
+      <p:ext uri="{BB962C8B-B14F-4D97-AF65-F5344CB8AC3E}">
+        <p14:creationId xmlns:p14="http://schemas.microsoft.com/office/powerpoint/2010/main" val="2965195592"/>
+      </p:ext>
+    </p:extLst>
+  </p:cSld>
+  <p:clrMapOvr>
+    <a:masterClrMapping/>
+  </p:clrMapOvr>
+</p:sld>
+</file>
+
+<file path=ppt/slides/slide28.xml><?xml version="1.0" encoding="utf-8"?>
+<p:sld xmlns:a="http://schemas.openxmlformats.org/drawingml/2006/main" xmlns:r="http://schemas.openxmlformats.org/officeDocument/2006/relationships" xmlns:p="http://schemas.openxmlformats.org/presentationml/2006/main">
+  <p:cSld>
+    <p:spTree>
+      <p:nvGrpSpPr>
+        <p:cNvPr id="1" name=""/>
+        <p:cNvGrpSpPr/>
+        <p:nvPr/>
+      </p:nvGrpSpPr>
+      <p:grpSpPr>
+        <a:xfrm>
+          <a:off x="0" y="0"/>
+          <a:ext cx="0" cy="0"/>
+          <a:chOff x="0" y="0"/>
+          <a:chExt cx="0" cy="0"/>
+        </a:xfrm>
+      </p:grpSpPr>
+      <p:sp>
+        <p:nvSpPr>
+          <p:cNvPr id="4" name="日付プレースホルダー 3"/>
+          <p:cNvSpPr>
+            <a:spLocks noGrp="1"/>
+          </p:cNvSpPr>
+          <p:nvPr>
+            <p:ph type="dt" sz="half" idx="10"/>
+          </p:nvPr>
+        </p:nvSpPr>
+        <p:spPr/>
+        <p:txBody>
+          <a:bodyPr/>
+          <a:lstStyle/>
+          <a:p>
+            <a:r>
+              <a:rPr kumimoji="1" lang="en-US" altLang="ja-JP"/>
+              <a:t>2017/4/11</a:t>
+            </a:r>
+            <a:endParaRPr kumimoji="1" lang="ja-JP" altLang="en-US"/>
+          </a:p>
+        </p:txBody>
+      </p:sp>
+      <p:sp>
+        <p:nvSpPr>
+          <p:cNvPr id="5" name="フッター プレースホルダー 4"/>
+          <p:cNvSpPr>
+            <a:spLocks noGrp="1"/>
+          </p:cNvSpPr>
+          <p:nvPr>
+            <p:ph type="ftr" sz="quarter" idx="11"/>
+          </p:nvPr>
+        </p:nvSpPr>
+        <p:spPr/>
+        <p:txBody>
+          <a:bodyPr/>
+          <a:lstStyle/>
+          <a:p>
+            <a:r>
+              <a:rPr kumimoji="1" lang="en-US" altLang="ja-JP"/>
+              <a:t>BEACLS: Berkeley Efficient API in C++ for Level Set methods Installation Guide</a:t>
+            </a:r>
+            <a:endParaRPr kumimoji="1" lang="ja-JP" altLang="en-US"/>
+          </a:p>
+        </p:txBody>
+      </p:sp>
+      <p:sp>
+        <p:nvSpPr>
+          <p:cNvPr id="6" name="スライド番号プレースホルダー 5"/>
+          <p:cNvSpPr>
+            <a:spLocks noGrp="1"/>
+          </p:cNvSpPr>
+          <p:nvPr>
+            <p:ph type="sldNum" sz="quarter" idx="12"/>
+          </p:nvPr>
+        </p:nvSpPr>
+        <p:spPr/>
+        <p:txBody>
+          <a:bodyPr/>
+          <a:lstStyle/>
+          <a:p>
+            <a:fld id="{E1773B30-14F7-487C-92FB-E55AB7D5608F}" type="slidenum">
+              <a:rPr kumimoji="1" lang="ja-JP" altLang="en-US" smtClean="0"/>
+              <a:t>28</a:t>
             </a:fld>
             <a:endParaRPr kumimoji="1" lang="ja-JP" altLang="en-US"/>
           </a:p>
@@ -14539,6 +15484,18 @@
             </a:r>
           </a:p>
           <a:p>
+            <a:r>
+              <a:rPr lang="en-US" altLang="ja-JP" dirty="0">
+                <a:solidFill>
+                  <a:schemeClr val="bg1">
+                    <a:lumMod val="50000"/>
+                  </a:schemeClr>
+                </a:solidFill>
+              </a:rPr>
+              <a:t>Bash on Ubuntu on Windows without GPU</a:t>
+            </a:r>
+          </a:p>
+          <a:p>
             <a:pPr marL="0" indent="0">
               <a:buNone/>
             </a:pPr>
@@ -14563,7 +15520,7 @@
           <a:p>
             <a:r>
               <a:rPr kumimoji="1" lang="en-US" altLang="ja-JP"/>
-              <a:t>2017/4/4</a:t>
+              <a:t>2017/4/11</a:t>
             </a:r>
             <a:endParaRPr kumimoji="1" lang="ja-JP" altLang="en-US"/>
           </a:p>
@@ -14680,7 +15637,9 @@
         </p:nvSpPr>
         <p:spPr/>
         <p:txBody>
-          <a:bodyPr/>
+          <a:bodyPr>
+            <a:normAutofit fontScale="92500" lnSpcReduction="20000"/>
+          </a:bodyPr>
           <a:lstStyle/>
           <a:p>
             <a:r>
@@ -14774,6 +15733,27 @@
             </a:r>
           </a:p>
           <a:p>
+            <a:pPr lvl="1"/>
+            <a:r>
+              <a:rPr lang="en-US" altLang="ja-JP" dirty="0"/>
+              <a:t>OS</a:t>
+            </a:r>
+          </a:p>
+          <a:p>
+            <a:pPr lvl="2"/>
+            <a:r>
+              <a:rPr lang="en-US" altLang="ja-JP" dirty="0"/>
+              <a:t>Windows 10 Creators Update (version 1703, Redstone 2)</a:t>
+            </a:r>
+          </a:p>
+          <a:p>
+            <a:pPr lvl="3"/>
+            <a:r>
+              <a:rPr lang="en-US" altLang="ja-JP" dirty="0"/>
+              <a:t>Required for Bash on Ubuntu on Windows </a:t>
+            </a:r>
+          </a:p>
+          <a:p>
             <a:endParaRPr lang="en-US" altLang="ja-JP" dirty="0"/>
           </a:p>
           <a:p>
@@ -14799,7 +15779,7 @@
           <a:p>
             <a:r>
               <a:rPr kumimoji="1" lang="en-US" altLang="ja-JP"/>
-              <a:t>2017/4/4</a:t>
+              <a:t>2017/4/11</a:t>
             </a:r>
             <a:endParaRPr kumimoji="1" lang="ja-JP" altLang="en-US"/>
           </a:p>
@@ -14985,9 +15965,16 @@
             </a:r>
           </a:p>
           <a:p>
-            <a:pPr marL="0" indent="0">
-              <a:buNone/>
-            </a:pPr>
+            <a:r>
+              <a:rPr lang="en-US" altLang="ja-JP" dirty="0">
+                <a:solidFill>
+                  <a:schemeClr val="bg1">
+                    <a:lumMod val="50000"/>
+                  </a:schemeClr>
+                </a:solidFill>
+              </a:rPr>
+              <a:t>Bash on Ubuntu on Windows without GPU</a:t>
+            </a:r>
             <a:endParaRPr kumimoji="1" lang="ja-JP" altLang="en-US" dirty="0"/>
           </a:p>
         </p:txBody>
@@ -15009,7 +15996,7 @@
           <a:p>
             <a:r>
               <a:rPr kumimoji="1" lang="en-US" altLang="ja-JP"/>
-              <a:t>2017/4/4</a:t>
+              <a:t>2017/4/11</a:t>
             </a:r>
             <a:endParaRPr kumimoji="1" lang="ja-JP" altLang="en-US"/>
           </a:p>
@@ -15451,7 +16438,7 @@
           <a:p>
             <a:r>
               <a:rPr kumimoji="1" lang="en-US" altLang="ja-JP"/>
-              <a:t>2017/4/4</a:t>
+              <a:t>2017/4/11</a:t>
             </a:r>
             <a:endParaRPr kumimoji="1" lang="ja-JP" altLang="en-US"/>
           </a:p>
@@ -15637,9 +16624,16 @@
             </a:r>
           </a:p>
           <a:p>
-            <a:pPr marL="0" indent="0">
-              <a:buNone/>
-            </a:pPr>
+            <a:r>
+              <a:rPr lang="en-US" altLang="ja-JP" dirty="0">
+                <a:solidFill>
+                  <a:schemeClr val="bg1">
+                    <a:lumMod val="50000"/>
+                  </a:schemeClr>
+                </a:solidFill>
+              </a:rPr>
+              <a:t>Bash on Ubuntu on Windows without GPU</a:t>
+            </a:r>
             <a:endParaRPr kumimoji="1" lang="ja-JP" altLang="en-US" dirty="0"/>
           </a:p>
         </p:txBody>
@@ -15661,7 +16655,7 @@
           <a:p>
             <a:r>
               <a:rPr kumimoji="1" lang="en-US" altLang="ja-JP"/>
-              <a:t>2017/4/4</a:t>
+              <a:t>2017/4/11</a:t>
             </a:r>
             <a:endParaRPr kumimoji="1" lang="ja-JP" altLang="en-US"/>
           </a:p>
@@ -16043,7 +17037,7 @@
           <a:p>
             <a:r>
               <a:rPr kumimoji="1" lang="en-US" altLang="ja-JP"/>
-              <a:t>2017/4/4</a:t>
+              <a:t>2017/4/11</a:t>
             </a:r>
             <a:endParaRPr kumimoji="1" lang="ja-JP" altLang="en-US"/>
           </a:p>
@@ -16229,6 +17223,18 @@
             </a:r>
           </a:p>
           <a:p>
+            <a:r>
+              <a:rPr lang="en-US" altLang="ja-JP" dirty="0">
+                <a:solidFill>
+                  <a:schemeClr val="bg1">
+                    <a:lumMod val="50000"/>
+                  </a:schemeClr>
+                </a:solidFill>
+              </a:rPr>
+              <a:t>Bash on Ubuntu on Windows without GPU</a:t>
+            </a:r>
+          </a:p>
+          <a:p>
             <a:pPr marL="0" indent="0">
               <a:buNone/>
             </a:pPr>
@@ -16253,7 +17259,7 @@
           <a:p>
             <a:r>
               <a:rPr kumimoji="1" lang="en-US" altLang="ja-JP"/>
-              <a:t>2017/4/4</a:t>
+              <a:t>2017/4/11</a:t>
             </a:r>
             <a:endParaRPr kumimoji="1" lang="ja-JP" altLang="en-US"/>
           </a:p>

</xml_diff>

<commit_message>
- Added installation of X Server for Windows.
</commit_message>
<xml_diff>
--- a/docs/slides/master/BEACLS_Installation_Guide.pptx
+++ b/docs/slides/master/BEACLS_Installation_Guide.pptx
@@ -7,7 +7,7 @@
     <p:sldMasterId id="2147483737" r:id="rId3"/>
   </p:sldMasterIdLst>
   <p:notesMasterIdLst>
-    <p:notesMasterId r:id="rId32"/>
+    <p:notesMasterId r:id="rId31"/>
   </p:notesMasterIdLst>
   <p:sldIdLst>
     <p:sldId id="256" r:id="rId4"/>
@@ -36,8 +36,7 @@
     <p:sldId id="417" r:id="rId27"/>
     <p:sldId id="419" r:id="rId28"/>
     <p:sldId id="420" r:id="rId29"/>
-    <p:sldId id="418" r:id="rId30"/>
-    <p:sldId id="397" r:id="rId31"/>
+    <p:sldId id="397" r:id="rId30"/>
   </p:sldIdLst>
   <p:sldSz cx="12192000" cy="6858000"/>
   <p:notesSz cx="6858000" cy="9144000"/>
@@ -14592,7 +14591,7 @@
         <p:spPr/>
         <p:txBody>
           <a:bodyPr>
-            <a:normAutofit/>
+            <a:normAutofit lnSpcReduction="10000"/>
           </a:bodyPr>
           <a:lstStyle/>
           <a:p>
@@ -14612,7 +14611,7 @@
             </a:pPr>
             <a:r>
               <a:rPr lang="en-US" altLang="ja-JP" dirty="0"/>
-              <a:t>Install Bash on Ubuntu on Windows</a:t>
+              <a:t>Install X Window System Server for Windows</a:t>
             </a:r>
           </a:p>
           <a:p>
@@ -14620,9 +14619,28 @@
               <a:buNone/>
             </a:pPr>
             <a:r>
-              <a:rPr lang="en-US" altLang="ja-JP" dirty="0"/>
-              <a:t>https://msdn.microsoft.com/en-us/commandline/wsl/install_guide</a:t>
-            </a:r>
+              <a:rPr lang="en-US" altLang="ja-JP" dirty="0" err="1"/>
+              <a:t>Cf</a:t>
+            </a:r>
+            <a:r>
+              <a:rPr lang="en-US" altLang="ja-JP" dirty="0"/>
+              <a:t>) </a:t>
+            </a:r>
+            <a:r>
+              <a:rPr lang="en-US" altLang="ja-JP" dirty="0" err="1"/>
+              <a:t>Xming</a:t>
+            </a:r>
+            <a:r>
+              <a:rPr lang="en-US" altLang="ja-JP" dirty="0"/>
+              <a:t> : </a:t>
+            </a:r>
+            <a:r>
+              <a:rPr lang="en-US" altLang="ja-JP" dirty="0">
+                <a:hlinkClick r:id="rId2"/>
+              </a:rPr>
+              <a:t>http://www.straightrunning.com/XmingNotes/</a:t>
+            </a:r>
+            <a:endParaRPr lang="en-US" altLang="ja-JP" dirty="0"/>
           </a:p>
           <a:p>
             <a:pPr marL="514350" indent="-514350">
@@ -14631,7 +14649,58 @@
             </a:pPr>
             <a:r>
               <a:rPr lang="en-US" altLang="ja-JP" dirty="0"/>
+              <a:t>Run X Windows System Server</a:t>
+            </a:r>
+          </a:p>
+          <a:p>
+            <a:pPr marL="514350" indent="-514350">
+              <a:buFont typeface="+mj-lt"/>
+              <a:buAutoNum type="arabicPeriod"/>
+            </a:pPr>
+            <a:r>
+              <a:rPr lang="en-US" altLang="ja-JP" dirty="0"/>
+              <a:t>Install Bash on Ubuntu on Windows</a:t>
+            </a:r>
+          </a:p>
+          <a:p>
+            <a:pPr marL="457200" lvl="1" indent="0">
+              <a:buNone/>
+            </a:pPr>
+            <a:r>
+              <a:rPr lang="en-US" altLang="ja-JP" dirty="0">
+                <a:hlinkClick r:id="rId3"/>
+              </a:rPr>
+              <a:t>https://msdn.microsoft.com/en-us/commandline/wsl/install_guide</a:t>
+            </a:r>
+            <a:endParaRPr lang="en-US" altLang="ja-JP" dirty="0"/>
+          </a:p>
+          <a:p>
+            <a:pPr marL="514350" indent="-514350">
+              <a:buFont typeface="+mj-lt"/>
+              <a:buAutoNum type="arabicPeriod"/>
+            </a:pPr>
+            <a:r>
+              <a:rPr lang="en-US" altLang="ja-JP" dirty="0"/>
               <a:t>Run bash</a:t>
+            </a:r>
+          </a:p>
+          <a:p>
+            <a:pPr marL="514350" indent="-514350">
+              <a:buFont typeface="+mj-lt"/>
+              <a:buAutoNum type="arabicPeriod"/>
+            </a:pPr>
+            <a:r>
+              <a:rPr lang="en-US" altLang="ja-JP" dirty="0"/>
+              <a:t>Set DISPLAY environment variable</a:t>
+            </a:r>
+          </a:p>
+          <a:p>
+            <a:pPr marL="457200" lvl="1" indent="0">
+              <a:buNone/>
+            </a:pPr>
+            <a:r>
+              <a:rPr lang="en-US" altLang="ja-JP" dirty="0"/>
+              <a:t>$ export DISPLAY=0:0</a:t>
             </a:r>
           </a:p>
         </p:txBody>
@@ -14786,7 +14855,7 @@
           <a:p>
             <a:pPr marL="514350" indent="-514350">
               <a:buFont typeface="+mj-lt"/>
-              <a:buAutoNum type="arabicPeriod" startAt="4"/>
+              <a:buAutoNum type="arabicPeriod" startAt="7"/>
             </a:pPr>
             <a:r>
               <a:rPr lang="en-US" altLang="ja-JP" dirty="0"/>
@@ -14863,7 +14932,7 @@
           <a:p>
             <a:pPr marL="514350" indent="-514350">
               <a:buFont typeface="+mj-lt"/>
-              <a:buAutoNum type="arabicPeriod" startAt="4"/>
+              <a:buAutoNum type="arabicPeriod" startAt="7"/>
             </a:pPr>
             <a:r>
               <a:rPr lang="en-US" altLang="ja-JP" dirty="0"/>
@@ -14928,7 +14997,7 @@
           <a:p>
             <a:pPr marL="514350" indent="-514350">
               <a:buFont typeface="+mj-lt"/>
-              <a:buAutoNum type="arabicPeriod" startAt="4"/>
+              <a:buAutoNum type="arabicPeriod" startAt="7"/>
             </a:pPr>
             <a:r>
               <a:rPr lang="en-US" altLang="ja-JP" dirty="0"/>
@@ -14964,7 +15033,7 @@
           <a:p>
             <a:pPr marL="514350" indent="-514350">
               <a:buFont typeface="+mj-lt"/>
-              <a:buAutoNum type="arabicPeriod" startAt="4"/>
+              <a:buAutoNum type="arabicPeriod" startAt="7"/>
             </a:pPr>
             <a:r>
               <a:rPr lang="en-US" altLang="ja-JP" dirty="0"/>
@@ -15097,44 +15166,6 @@
       </p:grpSpPr>
       <p:sp>
         <p:nvSpPr>
-          <p:cNvPr id="2" name="タイトル 1"/>
-          <p:cNvSpPr>
-            <a:spLocks noGrp="1"/>
-          </p:cNvSpPr>
-          <p:nvPr>
-            <p:ph type="title"/>
-          </p:nvPr>
-        </p:nvSpPr>
-        <p:spPr/>
-        <p:txBody>
-          <a:bodyPr/>
-          <a:lstStyle/>
-          <a:p>
-            <a:endParaRPr kumimoji="1" lang="ja-JP" altLang="en-US"/>
-          </a:p>
-        </p:txBody>
-      </p:sp>
-      <p:sp>
-        <p:nvSpPr>
-          <p:cNvPr id="3" name="コンテンツ プレースホルダー 2"/>
-          <p:cNvSpPr>
-            <a:spLocks noGrp="1"/>
-          </p:cNvSpPr>
-          <p:nvPr>
-            <p:ph idx="1"/>
-          </p:nvPr>
-        </p:nvSpPr>
-        <p:spPr/>
-        <p:txBody>
-          <a:bodyPr/>
-          <a:lstStyle/>
-          <a:p>
-            <a:endParaRPr kumimoji="1" lang="ja-JP" altLang="en-US"/>
-          </a:p>
-        </p:txBody>
-      </p:sp>
-      <p:sp>
-        <p:nvSpPr>
           <p:cNvPr id="4" name="日付プレースホルダー 3"/>
           <p:cNvSpPr>
             <a:spLocks noGrp="1"/>
@@ -15197,105 +15228,6 @@
             <a:fld id="{E1773B30-14F7-487C-92FB-E55AB7D5608F}" type="slidenum">
               <a:rPr kumimoji="1" lang="ja-JP" altLang="en-US" smtClean="0"/>
               <a:t>27</a:t>
-            </a:fld>
-            <a:endParaRPr kumimoji="1" lang="ja-JP" altLang="en-US"/>
-          </a:p>
-        </p:txBody>
-      </p:sp>
-    </p:spTree>
-    <p:extLst>
-      <p:ext uri="{BB962C8B-B14F-4D97-AF65-F5344CB8AC3E}">
-        <p14:creationId xmlns:p14="http://schemas.microsoft.com/office/powerpoint/2010/main" val="2965195592"/>
-      </p:ext>
-    </p:extLst>
-  </p:cSld>
-  <p:clrMapOvr>
-    <a:masterClrMapping/>
-  </p:clrMapOvr>
-</p:sld>
-</file>
-
-<file path=ppt/slides/slide28.xml><?xml version="1.0" encoding="utf-8"?>
-<p:sld xmlns:a="http://schemas.openxmlformats.org/drawingml/2006/main" xmlns:r="http://schemas.openxmlformats.org/officeDocument/2006/relationships" xmlns:p="http://schemas.openxmlformats.org/presentationml/2006/main">
-  <p:cSld>
-    <p:spTree>
-      <p:nvGrpSpPr>
-        <p:cNvPr id="1" name=""/>
-        <p:cNvGrpSpPr/>
-        <p:nvPr/>
-      </p:nvGrpSpPr>
-      <p:grpSpPr>
-        <a:xfrm>
-          <a:off x="0" y="0"/>
-          <a:ext cx="0" cy="0"/>
-          <a:chOff x="0" y="0"/>
-          <a:chExt cx="0" cy="0"/>
-        </a:xfrm>
-      </p:grpSpPr>
-      <p:sp>
-        <p:nvSpPr>
-          <p:cNvPr id="4" name="日付プレースホルダー 3"/>
-          <p:cNvSpPr>
-            <a:spLocks noGrp="1"/>
-          </p:cNvSpPr>
-          <p:nvPr>
-            <p:ph type="dt" sz="half" idx="10"/>
-          </p:nvPr>
-        </p:nvSpPr>
-        <p:spPr/>
-        <p:txBody>
-          <a:bodyPr/>
-          <a:lstStyle/>
-          <a:p>
-            <a:r>
-              <a:rPr kumimoji="1" lang="en-US" altLang="ja-JP"/>
-              <a:t>2017/4/11</a:t>
-            </a:r>
-            <a:endParaRPr kumimoji="1" lang="ja-JP" altLang="en-US"/>
-          </a:p>
-        </p:txBody>
-      </p:sp>
-      <p:sp>
-        <p:nvSpPr>
-          <p:cNvPr id="5" name="フッター プレースホルダー 4"/>
-          <p:cNvSpPr>
-            <a:spLocks noGrp="1"/>
-          </p:cNvSpPr>
-          <p:nvPr>
-            <p:ph type="ftr" sz="quarter" idx="11"/>
-          </p:nvPr>
-        </p:nvSpPr>
-        <p:spPr/>
-        <p:txBody>
-          <a:bodyPr/>
-          <a:lstStyle/>
-          <a:p>
-            <a:r>
-              <a:rPr kumimoji="1" lang="en-US" altLang="ja-JP"/>
-              <a:t>BEACLS: Berkeley Efficient API in C++ for Level Set methods Installation Guide</a:t>
-            </a:r>
-            <a:endParaRPr kumimoji="1" lang="ja-JP" altLang="en-US"/>
-          </a:p>
-        </p:txBody>
-      </p:sp>
-      <p:sp>
-        <p:nvSpPr>
-          <p:cNvPr id="6" name="スライド番号プレースホルダー 5"/>
-          <p:cNvSpPr>
-            <a:spLocks noGrp="1"/>
-          </p:cNvSpPr>
-          <p:nvPr>
-            <p:ph type="sldNum" sz="quarter" idx="12"/>
-          </p:nvPr>
-        </p:nvSpPr>
-        <p:spPr/>
-        <p:txBody>
-          <a:bodyPr/>
-          <a:lstStyle/>
-          <a:p>
-            <a:fld id="{E1773B30-14F7-487C-92FB-E55AB7D5608F}" type="slidenum">
-              <a:rPr kumimoji="1" lang="ja-JP" altLang="en-US" smtClean="0"/>
-              <a:t>28</a:t>
             </a:fld>
             <a:endParaRPr kumimoji="1" lang="ja-JP" altLang="en-US"/>
           </a:p>

</xml_diff>

<commit_message>
Implementation of ad hock xs calculation to reduce residential memory.
</commit_message>
<xml_diff>
--- a/docs/slides/master/BEACLS_Installation_Guide.pptx
+++ b/docs/slides/master/BEACLS_Installation_Guide.pptx
@@ -225,7 +225,7 @@
           <a:p>
             <a:fld id="{7F36865F-2968-4FBD-B838-641F48D6CCC5}" type="datetimeFigureOut">
               <a:rPr kumimoji="1" lang="ja-JP" altLang="en-US" smtClean="0"/>
-              <a:t>2017/4/11</a:t>
+              <a:t>2018/5/14</a:t>
             </a:fld>
             <a:endParaRPr kumimoji="1" lang="ja-JP" altLang="en-US"/>
           </a:p>
@@ -14927,6 +14927,14 @@
             <a:r>
               <a:rPr lang="en-US" altLang="ja-JP" dirty="0"/>
               <a:t>-dev</a:t>
+            </a:r>
+            <a:r>
+              <a:rPr lang="ja-JP" altLang="en-US" dirty="0"/>
+              <a:t> </a:t>
+            </a:r>
+            <a:r>
+              <a:rPr lang="en-US" altLang="ja-JP" dirty="0"/>
+              <a:t>make</a:t>
             </a:r>
           </a:p>
           <a:p>

</xml_diff>